<commit_message>
Added question 5 to the self test for Distributed Systems Introduction.
</commit_message>
<xml_diff>
--- a/DistributedSystemsIntroduction/DistributedSystemsIntroductionSelfTest.pptx
+++ b/DistributedSystemsIntroduction/DistributedSystemsIntroductionSelfTest.pptx
@@ -8,6 +8,8 @@
     <p:sldId id="258" r:id="rId2"/>
     <p:sldId id="259" r:id="rId3"/>
     <p:sldId id="260" r:id="rId4"/>
+    <p:sldId id="261" r:id="rId5"/>
+    <p:sldId id="262" r:id="rId6"/>
   </p:sldIdLst>
   <p:sldSz cx="9144000" cy="6858000" type="screen4x3"/>
   <p:notesSz cx="6858000" cy="9144000"/>
@@ -290,7 +292,7 @@
           <a:p>
             <a:fld id="{F6AE8460-8906-0249-A868-A782B0A77FF7}" type="datetimeFigureOut">
               <a:rPr lang="en-US" smtClean="0"/>
-              <a:t>10/10/21</a:t>
+              <a:t>10/11/21</a:t>
             </a:fld>
             <a:endParaRPr lang="en-US"/>
           </a:p>
@@ -460,7 +462,7 @@
           <a:p>
             <a:fld id="{F6AE8460-8906-0249-A868-A782B0A77FF7}" type="datetimeFigureOut">
               <a:rPr lang="en-US" smtClean="0"/>
-              <a:t>10/10/21</a:t>
+              <a:t>10/11/21</a:t>
             </a:fld>
             <a:endParaRPr lang="en-US"/>
           </a:p>
@@ -640,7 +642,7 @@
           <a:p>
             <a:fld id="{F6AE8460-8906-0249-A868-A782B0A77FF7}" type="datetimeFigureOut">
               <a:rPr lang="en-US" smtClean="0"/>
-              <a:t>10/10/21</a:t>
+              <a:t>10/11/21</a:t>
             </a:fld>
             <a:endParaRPr lang="en-US"/>
           </a:p>
@@ -810,7 +812,7 @@
           <a:p>
             <a:fld id="{F6AE8460-8906-0249-A868-A782B0A77FF7}" type="datetimeFigureOut">
               <a:rPr lang="en-US" smtClean="0"/>
-              <a:t>10/10/21</a:t>
+              <a:t>10/11/21</a:t>
             </a:fld>
             <a:endParaRPr lang="en-US"/>
           </a:p>
@@ -1056,7 +1058,7 @@
           <a:p>
             <a:fld id="{F6AE8460-8906-0249-A868-A782B0A77FF7}" type="datetimeFigureOut">
               <a:rPr lang="en-US" smtClean="0"/>
-              <a:t>10/10/21</a:t>
+              <a:t>10/11/21</a:t>
             </a:fld>
             <a:endParaRPr lang="en-US"/>
           </a:p>
@@ -1344,7 +1346,7 @@
           <a:p>
             <a:fld id="{F6AE8460-8906-0249-A868-A782B0A77FF7}" type="datetimeFigureOut">
               <a:rPr lang="en-US" smtClean="0"/>
-              <a:t>10/10/21</a:t>
+              <a:t>10/11/21</a:t>
             </a:fld>
             <a:endParaRPr lang="en-US"/>
           </a:p>
@@ -1766,7 +1768,7 @@
           <a:p>
             <a:fld id="{F6AE8460-8906-0249-A868-A782B0A77FF7}" type="datetimeFigureOut">
               <a:rPr lang="en-US" smtClean="0"/>
-              <a:t>10/10/21</a:t>
+              <a:t>10/11/21</a:t>
             </a:fld>
             <a:endParaRPr lang="en-US"/>
           </a:p>
@@ -1884,7 +1886,7 @@
           <a:p>
             <a:fld id="{F6AE8460-8906-0249-A868-A782B0A77FF7}" type="datetimeFigureOut">
               <a:rPr lang="en-US" smtClean="0"/>
-              <a:t>10/10/21</a:t>
+              <a:t>10/11/21</a:t>
             </a:fld>
             <a:endParaRPr lang="en-US"/>
           </a:p>
@@ -1979,7 +1981,7 @@
           <a:p>
             <a:fld id="{F6AE8460-8906-0249-A868-A782B0A77FF7}" type="datetimeFigureOut">
               <a:rPr lang="en-US" smtClean="0"/>
-              <a:t>10/10/21</a:t>
+              <a:t>10/11/21</a:t>
             </a:fld>
             <a:endParaRPr lang="en-US"/>
           </a:p>
@@ -2256,7 +2258,7 @@
           <a:p>
             <a:fld id="{F6AE8460-8906-0249-A868-A782B0A77FF7}" type="datetimeFigureOut">
               <a:rPr lang="en-US" smtClean="0"/>
-              <a:t>10/10/21</a:t>
+              <a:t>10/11/21</a:t>
             </a:fld>
             <a:endParaRPr lang="en-US"/>
           </a:p>
@@ -2509,7 +2511,7 @@
           <a:p>
             <a:fld id="{F6AE8460-8906-0249-A868-A782B0A77FF7}" type="datetimeFigureOut">
               <a:rPr lang="en-US" smtClean="0"/>
-              <a:t>10/10/21</a:t>
+              <a:t>10/11/21</a:t>
             </a:fld>
             <a:endParaRPr lang="en-US"/>
           </a:p>
@@ -2722,7 +2724,7 @@
           <a:p>
             <a:fld id="{F6AE8460-8906-0249-A868-A782B0A77FF7}" type="datetimeFigureOut">
               <a:rPr lang="en-US" smtClean="0"/>
-              <a:t>10/10/21</a:t>
+              <a:t>10/11/21</a:t>
             </a:fld>
             <a:endParaRPr lang="en-US"/>
           </a:p>
@@ -3312,7 +3314,6 @@
               <a:rPr lang="en-US" sz="4000" b="1" dirty="0"/>
               <a:t>x</a:t>
             </a:r>
-            <a:endParaRPr lang="en-US" sz="4000" b="1" dirty="0"/>
           </a:p>
         </p:txBody>
       </p:sp>
@@ -3596,11 +3597,6 @@
               </a:rPr>
               <a:t>0</a:t>
             </a:r>
-            <a:endParaRPr lang="en-US" sz="4000" b="1" dirty="0">
-              <a:solidFill>
-                <a:schemeClr val="tx1"/>
-              </a:solidFill>
-            </a:endParaRPr>
           </a:p>
         </p:txBody>
       </p:sp>
@@ -3712,11 +3708,6 @@
               </a:rPr>
               <a:t>2</a:t>
             </a:r>
-            <a:endParaRPr lang="en-US" sz="4000" b="1" dirty="0">
-              <a:solidFill>
-                <a:schemeClr val="tx1"/>
-              </a:solidFill>
-            </a:endParaRPr>
           </a:p>
         </p:txBody>
       </p:sp>
@@ -4125,7 +4116,6 @@
               <a:rPr lang="en-US" sz="4000" b="1" dirty="0"/>
               <a:t>x</a:t>
             </a:r>
-            <a:endParaRPr lang="en-US" sz="4000" b="1" dirty="0"/>
           </a:p>
         </p:txBody>
       </p:sp>
@@ -4341,11 +4331,6 @@
               </a:rPr>
               <a:t>0</a:t>
             </a:r>
-            <a:endParaRPr lang="en-US" sz="4000" b="1" dirty="0">
-              <a:solidFill>
-                <a:schemeClr val="tx1"/>
-              </a:solidFill>
-            </a:endParaRPr>
           </a:p>
         </p:txBody>
       </p:sp>
@@ -4457,11 +4442,6 @@
               </a:rPr>
               <a:t>2</a:t>
             </a:r>
-            <a:endParaRPr lang="en-US" sz="4000" b="1" dirty="0">
-              <a:solidFill>
-                <a:schemeClr val="tx1"/>
-              </a:solidFill>
-            </a:endParaRPr>
           </a:p>
         </p:txBody>
       </p:sp>
@@ -4768,7 +4748,6 @@
               <a:rPr lang="en-US" sz="4000" b="1" dirty="0"/>
               <a:t>x</a:t>
             </a:r>
-            <a:endParaRPr lang="en-US" sz="4000" b="1" dirty="0"/>
           </a:p>
         </p:txBody>
       </p:sp>
@@ -4984,11 +4963,6 @@
               </a:rPr>
               <a:t>0</a:t>
             </a:r>
-            <a:endParaRPr lang="en-US" sz="4000" b="1" dirty="0">
-              <a:solidFill>
-                <a:schemeClr val="tx1"/>
-              </a:solidFill>
-            </a:endParaRPr>
           </a:p>
         </p:txBody>
       </p:sp>
@@ -5042,11 +5016,6 @@
               </a:rPr>
               <a:t>3</a:t>
             </a:r>
-            <a:endParaRPr lang="en-US" sz="4000" b="1" dirty="0">
-              <a:solidFill>
-                <a:schemeClr val="tx1"/>
-              </a:solidFill>
-            </a:endParaRPr>
           </a:p>
         </p:txBody>
       </p:sp>
@@ -5100,11 +5069,6 @@
               </a:rPr>
               <a:t>2</a:t>
             </a:r>
-            <a:endParaRPr lang="en-US" sz="4000" b="1" dirty="0">
-              <a:solidFill>
-                <a:schemeClr val="tx1"/>
-              </a:solidFill>
-            </a:endParaRPr>
           </a:p>
         </p:txBody>
       </p:sp>
@@ -5158,6 +5122,87 @@
               </a:rPr>
               <a:t>1</a:t>
             </a:r>
+          </a:p>
+        </p:txBody>
+      </p:sp>
+    </p:spTree>
+    <p:extLst>
+      <p:ext uri="{BB962C8B-B14F-4D97-AF65-F5344CB8AC3E}">
+        <p14:creationId xmlns:p14="http://schemas.microsoft.com/office/powerpoint/2010/main" val="3102247775"/>
+      </p:ext>
+    </p:extLst>
+  </p:cSld>
+  <p:clrMapOvr>
+    <a:masterClrMapping/>
+  </p:clrMapOvr>
+</p:sld>
+</file>
+
+<file path=ppt/slides/slide4.xml><?xml version="1.0" encoding="utf-8"?>
+<p:sld xmlns:a="http://schemas.openxmlformats.org/drawingml/2006/main" xmlns:r="http://schemas.openxmlformats.org/officeDocument/2006/relationships" xmlns:p="http://schemas.openxmlformats.org/presentationml/2006/main">
+  <p:cSld>
+    <p:spTree>
+      <p:nvGrpSpPr>
+        <p:cNvPr id="1" name=""/>
+        <p:cNvGrpSpPr/>
+        <p:nvPr/>
+      </p:nvGrpSpPr>
+      <p:grpSpPr>
+        <a:xfrm>
+          <a:off x="0" y="0"/>
+          <a:ext cx="0" cy="0"/>
+          <a:chOff x="0" y="0"/>
+          <a:chExt cx="0" cy="0"/>
+        </a:xfrm>
+      </p:grpSpPr>
+      <p:sp>
+        <p:nvSpPr>
+          <p:cNvPr id="2" name="Oval 1"/>
+          <p:cNvSpPr/>
+          <p:nvPr/>
+        </p:nvSpPr>
+        <p:spPr>
+          <a:xfrm>
+            <a:off x="5849532" y="907885"/>
+            <a:ext cx="914400" cy="914400"/>
+          </a:xfrm>
+          <a:prstGeom prst="ellipse">
+            <a:avLst/>
+          </a:prstGeom>
+          <a:noFill/>
+          <a:ln w="38100" cmpd="sng">
+            <a:solidFill>
+              <a:schemeClr val="tx1"/>
+            </a:solidFill>
+          </a:ln>
+        </p:spPr>
+        <p:style>
+          <a:lnRef idx="1">
+            <a:schemeClr val="accent1"/>
+          </a:lnRef>
+          <a:fillRef idx="3">
+            <a:schemeClr val="accent1"/>
+          </a:fillRef>
+          <a:effectRef idx="2">
+            <a:schemeClr val="accent1"/>
+          </a:effectRef>
+          <a:fontRef idx="minor">
+            <a:schemeClr val="lt1"/>
+          </a:fontRef>
+        </p:style>
+        <p:txBody>
+          <a:bodyPr rtlCol="0" anchor="ctr"/>
+          <a:lstStyle/>
+          <a:p>
+            <a:pPr algn="ctr"/>
+            <a:r>
+              <a:rPr lang="en-US" sz="4000" b="1" dirty="0" smtClean="0">
+                <a:solidFill>
+                  <a:schemeClr val="tx1"/>
+                </a:solidFill>
+              </a:rPr>
+              <a:t>A</a:t>
+            </a:r>
             <a:endParaRPr lang="en-US" sz="4000" b="1" dirty="0">
               <a:solidFill>
                 <a:schemeClr val="tx1"/>
@@ -5166,10 +5211,1168 @@
           </a:p>
         </p:txBody>
       </p:sp>
+      <p:sp>
+        <p:nvSpPr>
+          <p:cNvPr id="3" name="Oval 2"/>
+          <p:cNvSpPr/>
+          <p:nvPr/>
+        </p:nvSpPr>
+        <p:spPr>
+          <a:xfrm>
+            <a:off x="784371" y="4937365"/>
+            <a:ext cx="914400" cy="914400"/>
+          </a:xfrm>
+          <a:prstGeom prst="ellipse">
+            <a:avLst/>
+          </a:prstGeom>
+          <a:noFill/>
+          <a:ln w="38100" cmpd="sng">
+            <a:solidFill>
+              <a:srgbClr val="000000"/>
+            </a:solidFill>
+          </a:ln>
+        </p:spPr>
+        <p:style>
+          <a:lnRef idx="1">
+            <a:schemeClr val="accent1"/>
+          </a:lnRef>
+          <a:fillRef idx="3">
+            <a:schemeClr val="accent1"/>
+          </a:fillRef>
+          <a:effectRef idx="2">
+            <a:schemeClr val="accent1"/>
+          </a:effectRef>
+          <a:fontRef idx="minor">
+            <a:schemeClr val="lt1"/>
+          </a:fontRef>
+        </p:style>
+        <p:txBody>
+          <a:bodyPr rtlCol="0" anchor="ctr"/>
+          <a:lstStyle/>
+          <a:p>
+            <a:pPr algn="ctr"/>
+            <a:r>
+              <a:rPr lang="en-US" sz="4000" b="1" dirty="0" smtClean="0">
+                <a:solidFill>
+                  <a:srgbClr val="000000"/>
+                </a:solidFill>
+              </a:rPr>
+              <a:t>B</a:t>
+            </a:r>
+            <a:endParaRPr lang="en-US" sz="4000" b="1" dirty="0">
+              <a:solidFill>
+                <a:srgbClr val="000000"/>
+              </a:solidFill>
+            </a:endParaRPr>
+          </a:p>
+        </p:txBody>
+      </p:sp>
+      <p:cxnSp>
+        <p:nvCxnSpPr>
+          <p:cNvPr id="4" name="Straight Arrow Connector 3"/>
+          <p:cNvCxnSpPr>
+            <a:stCxn id="2" idx="4"/>
+            <a:endCxn id="3" idx="0"/>
+          </p:cNvCxnSpPr>
+          <p:nvPr/>
+        </p:nvCxnSpPr>
+        <p:spPr>
+          <a:xfrm flipH="1">
+            <a:off x="1241571" y="1822285"/>
+            <a:ext cx="5065161" cy="3115080"/>
+          </a:xfrm>
+          <a:prstGeom prst="straightConnector1">
+            <a:avLst/>
+          </a:prstGeom>
+          <a:ln w="76200" cmpd="sng">
+            <a:solidFill>
+              <a:schemeClr val="accent1"/>
+            </a:solidFill>
+            <a:headEnd type="arrow"/>
+            <a:tailEnd type="none"/>
+          </a:ln>
+        </p:spPr>
+        <p:style>
+          <a:lnRef idx="2">
+            <a:schemeClr val="accent1"/>
+          </a:lnRef>
+          <a:fillRef idx="0">
+            <a:schemeClr val="accent1"/>
+          </a:fillRef>
+          <a:effectRef idx="1">
+            <a:schemeClr val="accent1"/>
+          </a:effectRef>
+          <a:fontRef idx="minor">
+            <a:schemeClr val="tx1"/>
+          </a:fontRef>
+        </p:style>
+      </p:cxnSp>
+      <p:cxnSp>
+        <p:nvCxnSpPr>
+          <p:cNvPr id="5" name="Curved Connector 4"/>
+          <p:cNvCxnSpPr>
+            <a:stCxn id="2" idx="2"/>
+            <a:endCxn id="3" idx="0"/>
+          </p:cNvCxnSpPr>
+          <p:nvPr/>
+        </p:nvCxnSpPr>
+        <p:spPr>
+          <a:xfrm rot="10800000" flipV="1">
+            <a:off x="1241572" y="1365085"/>
+            <a:ext cx="4607961" cy="3572280"/>
+          </a:xfrm>
+          <a:prstGeom prst="curvedConnector2">
+            <a:avLst/>
+          </a:prstGeom>
+          <a:ln w="76200" cmpd="sng">
+            <a:headEnd type="none"/>
+            <a:tailEnd type="arrow"/>
+          </a:ln>
+        </p:spPr>
+        <p:style>
+          <a:lnRef idx="2">
+            <a:schemeClr val="accent1"/>
+          </a:lnRef>
+          <a:fillRef idx="0">
+            <a:schemeClr val="accent1"/>
+          </a:fillRef>
+          <a:effectRef idx="1">
+            <a:schemeClr val="accent1"/>
+          </a:effectRef>
+          <a:fontRef idx="minor">
+            <a:schemeClr val="tx1"/>
+          </a:fontRef>
+        </p:style>
+      </p:cxnSp>
+      <p:sp>
+        <p:nvSpPr>
+          <p:cNvPr id="8" name="TextBox 7"/>
+          <p:cNvSpPr txBox="1"/>
+          <p:nvPr/>
+        </p:nvSpPr>
+        <p:spPr>
+          <a:xfrm>
+            <a:off x="1556845" y="3769611"/>
+            <a:ext cx="420357" cy="707886"/>
+          </a:xfrm>
+          <a:prstGeom prst="rect">
+            <a:avLst/>
+          </a:prstGeom>
+          <a:noFill/>
+        </p:spPr>
+        <p:txBody>
+          <a:bodyPr wrap="none" rtlCol="0">
+            <a:spAutoFit/>
+          </a:bodyPr>
+          <a:lstStyle/>
+          <a:p>
+            <a:r>
+              <a:rPr lang="en-US" sz="4000" b="1" dirty="0"/>
+              <a:t>x</a:t>
+            </a:r>
+          </a:p>
+        </p:txBody>
+      </p:sp>
+      <p:sp>
+        <p:nvSpPr>
+          <p:cNvPr id="9" name="TextBox 8"/>
+          <p:cNvSpPr txBox="1"/>
+          <p:nvPr/>
+        </p:nvSpPr>
+        <p:spPr>
+          <a:xfrm>
+            <a:off x="4829669" y="687853"/>
+            <a:ext cx="387296" cy="707886"/>
+          </a:xfrm>
+          <a:prstGeom prst="rect">
+            <a:avLst/>
+          </a:prstGeom>
+          <a:noFill/>
+        </p:spPr>
+        <p:txBody>
+          <a:bodyPr wrap="none" rtlCol="0">
+            <a:spAutoFit/>
+          </a:bodyPr>
+          <a:lstStyle/>
+          <a:p>
+            <a:r>
+              <a:rPr lang="en-US" sz="4000" b="1" dirty="0"/>
+              <a:t>z</a:t>
+            </a:r>
+          </a:p>
+        </p:txBody>
+      </p:sp>
+      <p:cxnSp>
+        <p:nvCxnSpPr>
+          <p:cNvPr id="14" name="Curved Connector 13"/>
+          <p:cNvCxnSpPr>
+            <a:stCxn id="3" idx="6"/>
+            <a:endCxn id="2" idx="5"/>
+          </p:cNvCxnSpPr>
+          <p:nvPr/>
+        </p:nvCxnSpPr>
+        <p:spPr>
+          <a:xfrm flipV="1">
+            <a:off x="1698771" y="1688374"/>
+            <a:ext cx="4931250" cy="3706191"/>
+          </a:xfrm>
+          <a:prstGeom prst="curvedConnector2">
+            <a:avLst/>
+          </a:prstGeom>
+          <a:ln w="76200" cmpd="sng">
+            <a:headEnd type="none"/>
+            <a:tailEnd type="arrow"/>
+          </a:ln>
+        </p:spPr>
+        <p:style>
+          <a:lnRef idx="2">
+            <a:schemeClr val="accent1"/>
+          </a:lnRef>
+          <a:fillRef idx="0">
+            <a:schemeClr val="accent1"/>
+          </a:fillRef>
+          <a:effectRef idx="1">
+            <a:schemeClr val="accent1"/>
+          </a:effectRef>
+          <a:fontRef idx="minor">
+            <a:schemeClr val="tx1"/>
+          </a:fontRef>
+        </p:style>
+      </p:cxnSp>
+      <p:sp>
+        <p:nvSpPr>
+          <p:cNvPr id="15" name="TextBox 14"/>
+          <p:cNvSpPr txBox="1"/>
+          <p:nvPr/>
+        </p:nvSpPr>
+        <p:spPr>
+          <a:xfrm>
+            <a:off x="2358312" y="4583422"/>
+            <a:ext cx="428322" cy="707886"/>
+          </a:xfrm>
+          <a:prstGeom prst="rect">
+            <a:avLst/>
+          </a:prstGeom>
+          <a:noFill/>
+        </p:spPr>
+        <p:txBody>
+          <a:bodyPr wrap="none" rtlCol="0">
+            <a:spAutoFit/>
+          </a:bodyPr>
+          <a:lstStyle/>
+          <a:p>
+            <a:r>
+              <a:rPr lang="en-US" sz="4000" b="1" dirty="0"/>
+              <a:t>y</a:t>
+            </a:r>
+          </a:p>
+        </p:txBody>
+      </p:sp>
+      <p:sp>
+        <p:nvSpPr>
+          <p:cNvPr id="16" name="TextBox 15"/>
+          <p:cNvSpPr txBox="1"/>
+          <p:nvPr/>
+        </p:nvSpPr>
+        <p:spPr>
+          <a:xfrm>
+            <a:off x="6998751" y="78069"/>
+            <a:ext cx="1877437" cy="707886"/>
+          </a:xfrm>
+          <a:prstGeom prst="rect">
+            <a:avLst/>
+          </a:prstGeom>
+          <a:noFill/>
+        </p:spPr>
+        <p:txBody>
+          <a:bodyPr wrap="none" rtlCol="0">
+            <a:spAutoFit/>
+          </a:bodyPr>
+          <a:lstStyle/>
+          <a:p>
+            <a:r>
+              <a:rPr lang="en-US" sz="4000" b="1" dirty="0" smtClean="0"/>
+              <a:t>Agent A</a:t>
+            </a:r>
+            <a:endParaRPr lang="en-US" sz="4000" b="1" dirty="0"/>
+          </a:p>
+        </p:txBody>
+      </p:sp>
+      <p:cxnSp>
+        <p:nvCxnSpPr>
+          <p:cNvPr id="18" name="Straight Arrow Connector 17"/>
+          <p:cNvCxnSpPr>
+            <a:stCxn id="16" idx="1"/>
+            <a:endCxn id="2" idx="7"/>
+          </p:cNvCxnSpPr>
+          <p:nvPr/>
+        </p:nvCxnSpPr>
+        <p:spPr>
+          <a:xfrm flipH="1">
+            <a:off x="6630021" y="432012"/>
+            <a:ext cx="368730" cy="609784"/>
+          </a:xfrm>
+          <a:prstGeom prst="straightConnector1">
+            <a:avLst/>
+          </a:prstGeom>
+          <a:ln>
+            <a:prstDash val="dash"/>
+            <a:tailEnd type="arrow"/>
+          </a:ln>
+        </p:spPr>
+        <p:style>
+          <a:lnRef idx="2">
+            <a:schemeClr val="accent1"/>
+          </a:lnRef>
+          <a:fillRef idx="0">
+            <a:schemeClr val="accent1"/>
+          </a:fillRef>
+          <a:effectRef idx="1">
+            <a:schemeClr val="accent1"/>
+          </a:effectRef>
+          <a:fontRef idx="minor">
+            <a:schemeClr val="tx1"/>
+          </a:fontRef>
+        </p:style>
+      </p:cxnSp>
+      <p:sp>
+        <p:nvSpPr>
+          <p:cNvPr id="28" name="Oval 27"/>
+          <p:cNvSpPr>
+            <a:spLocks noChangeAspect="1"/>
+          </p:cNvSpPr>
+          <p:nvPr/>
+        </p:nvSpPr>
+        <p:spPr>
+          <a:xfrm>
+            <a:off x="2538557" y="1547965"/>
+            <a:ext cx="637090" cy="640080"/>
+          </a:xfrm>
+          <a:prstGeom prst="ellipse">
+            <a:avLst/>
+          </a:prstGeom>
+          <a:noFill/>
+          <a:ln w="28575" cmpd="sng">
+            <a:solidFill>
+              <a:srgbClr val="FF0000"/>
+            </a:solidFill>
+          </a:ln>
+        </p:spPr>
+        <p:style>
+          <a:lnRef idx="1">
+            <a:schemeClr val="accent1"/>
+          </a:lnRef>
+          <a:fillRef idx="3">
+            <a:schemeClr val="accent1"/>
+          </a:fillRef>
+          <a:effectRef idx="2">
+            <a:schemeClr val="accent1"/>
+          </a:effectRef>
+          <a:fontRef idx="minor">
+            <a:schemeClr val="lt1"/>
+          </a:fontRef>
+        </p:style>
+        <p:txBody>
+          <a:bodyPr rtlCol="0" anchor="ctr"/>
+          <a:lstStyle/>
+          <a:p>
+            <a:pPr algn="ctr"/>
+            <a:r>
+              <a:rPr lang="en-US" sz="4000" b="1" dirty="0">
+                <a:solidFill>
+                  <a:schemeClr val="tx1"/>
+                </a:solidFill>
+              </a:rPr>
+              <a:t>0</a:t>
+            </a:r>
+          </a:p>
+        </p:txBody>
+      </p:sp>
+      <p:sp>
+        <p:nvSpPr>
+          <p:cNvPr id="29" name="Oval 28"/>
+          <p:cNvSpPr>
+            <a:spLocks noChangeAspect="1"/>
+          </p:cNvSpPr>
+          <p:nvPr/>
+        </p:nvSpPr>
+        <p:spPr>
+          <a:xfrm>
+            <a:off x="1721222" y="2110508"/>
+            <a:ext cx="637090" cy="640080"/>
+          </a:xfrm>
+          <a:prstGeom prst="ellipse">
+            <a:avLst/>
+          </a:prstGeom>
+          <a:noFill/>
+          <a:ln w="28575" cmpd="sng">
+            <a:solidFill>
+              <a:srgbClr val="FF0000"/>
+            </a:solidFill>
+          </a:ln>
+        </p:spPr>
+        <p:style>
+          <a:lnRef idx="1">
+            <a:schemeClr val="accent1"/>
+          </a:lnRef>
+          <a:fillRef idx="3">
+            <a:schemeClr val="accent1"/>
+          </a:fillRef>
+          <a:effectRef idx="2">
+            <a:schemeClr val="accent1"/>
+          </a:effectRef>
+          <a:fontRef idx="minor">
+            <a:schemeClr val="lt1"/>
+          </a:fontRef>
+        </p:style>
+        <p:txBody>
+          <a:bodyPr rtlCol="0" anchor="ctr"/>
+          <a:lstStyle/>
+          <a:p>
+            <a:pPr algn="ctr"/>
+            <a:r>
+              <a:rPr lang="en-US" sz="4000" b="1" dirty="0">
+                <a:solidFill>
+                  <a:schemeClr val="tx1"/>
+                </a:solidFill>
+              </a:rPr>
+              <a:t>3</a:t>
+            </a:r>
+          </a:p>
+        </p:txBody>
+      </p:sp>
+      <p:sp>
+        <p:nvSpPr>
+          <p:cNvPr id="30" name="Oval 29"/>
+          <p:cNvSpPr>
+            <a:spLocks noChangeAspect="1"/>
+          </p:cNvSpPr>
+          <p:nvPr/>
+        </p:nvSpPr>
+        <p:spPr>
+          <a:xfrm>
+            <a:off x="2512538" y="3136037"/>
+            <a:ext cx="637090" cy="640080"/>
+          </a:xfrm>
+          <a:prstGeom prst="ellipse">
+            <a:avLst/>
+          </a:prstGeom>
+          <a:noFill/>
+          <a:ln w="28575" cmpd="sng">
+            <a:solidFill>
+              <a:srgbClr val="FF0000"/>
+            </a:solidFill>
+          </a:ln>
+        </p:spPr>
+        <p:style>
+          <a:lnRef idx="1">
+            <a:schemeClr val="accent1"/>
+          </a:lnRef>
+          <a:fillRef idx="3">
+            <a:schemeClr val="accent1"/>
+          </a:fillRef>
+          <a:effectRef idx="2">
+            <a:schemeClr val="accent1"/>
+          </a:effectRef>
+          <a:fontRef idx="minor">
+            <a:schemeClr val="lt1"/>
+          </a:fontRef>
+        </p:style>
+        <p:txBody>
+          <a:bodyPr rtlCol="0" anchor="ctr"/>
+          <a:lstStyle/>
+          <a:p>
+            <a:pPr algn="ctr"/>
+            <a:r>
+              <a:rPr lang="en-US" sz="4000" b="1" dirty="0">
+                <a:solidFill>
+                  <a:schemeClr val="tx1"/>
+                </a:solidFill>
+              </a:rPr>
+              <a:t>2</a:t>
+            </a:r>
+          </a:p>
+        </p:txBody>
+      </p:sp>
+      <p:sp>
+        <p:nvSpPr>
+          <p:cNvPr id="31" name="Oval 30"/>
+          <p:cNvSpPr>
+            <a:spLocks noChangeAspect="1"/>
+          </p:cNvSpPr>
+          <p:nvPr/>
+        </p:nvSpPr>
+        <p:spPr>
+          <a:xfrm>
+            <a:off x="3149628" y="2815997"/>
+            <a:ext cx="637090" cy="640080"/>
+          </a:xfrm>
+          <a:prstGeom prst="ellipse">
+            <a:avLst/>
+          </a:prstGeom>
+          <a:noFill/>
+          <a:ln w="28575" cmpd="sng">
+            <a:solidFill>
+              <a:srgbClr val="FF0000"/>
+            </a:solidFill>
+          </a:ln>
+        </p:spPr>
+        <p:style>
+          <a:lnRef idx="1">
+            <a:schemeClr val="accent1"/>
+          </a:lnRef>
+          <a:fillRef idx="3">
+            <a:schemeClr val="accent1"/>
+          </a:fillRef>
+          <a:effectRef idx="2">
+            <a:schemeClr val="accent1"/>
+          </a:effectRef>
+          <a:fontRef idx="minor">
+            <a:schemeClr val="lt1"/>
+          </a:fontRef>
+        </p:style>
+        <p:txBody>
+          <a:bodyPr rtlCol="0" anchor="ctr"/>
+          <a:lstStyle/>
+          <a:p>
+            <a:pPr algn="ctr"/>
+            <a:r>
+              <a:rPr lang="en-US" sz="4000" b="1" dirty="0">
+                <a:solidFill>
+                  <a:schemeClr val="tx1"/>
+                </a:solidFill>
+              </a:rPr>
+              <a:t>1</a:t>
+            </a:r>
+          </a:p>
+        </p:txBody>
+      </p:sp>
     </p:spTree>
     <p:extLst>
       <p:ext uri="{BB962C8B-B14F-4D97-AF65-F5344CB8AC3E}">
-        <p14:creationId xmlns:p14="http://schemas.microsoft.com/office/powerpoint/2010/main" val="3102247775"/>
+        <p14:creationId xmlns:p14="http://schemas.microsoft.com/office/powerpoint/2010/main" val="3138074303"/>
+      </p:ext>
+    </p:extLst>
+  </p:cSld>
+  <p:clrMapOvr>
+    <a:masterClrMapping/>
+  </p:clrMapOvr>
+</p:sld>
+</file>
+
+<file path=ppt/slides/slide5.xml><?xml version="1.0" encoding="utf-8"?>
+<p:sld xmlns:a="http://schemas.openxmlformats.org/drawingml/2006/main" xmlns:r="http://schemas.openxmlformats.org/officeDocument/2006/relationships" xmlns:p="http://schemas.openxmlformats.org/presentationml/2006/main">
+  <p:cSld>
+    <p:spTree>
+      <p:nvGrpSpPr>
+        <p:cNvPr id="1" name=""/>
+        <p:cNvGrpSpPr/>
+        <p:nvPr/>
+      </p:nvGrpSpPr>
+      <p:grpSpPr>
+        <a:xfrm>
+          <a:off x="0" y="0"/>
+          <a:ext cx="0" cy="0"/>
+          <a:chOff x="0" y="0"/>
+          <a:chExt cx="0" cy="0"/>
+        </a:xfrm>
+      </p:grpSpPr>
+      <p:sp>
+        <p:nvSpPr>
+          <p:cNvPr id="2" name="Oval 1"/>
+          <p:cNvSpPr/>
+          <p:nvPr/>
+        </p:nvSpPr>
+        <p:spPr>
+          <a:xfrm>
+            <a:off x="5849532" y="907885"/>
+            <a:ext cx="914400" cy="914400"/>
+          </a:xfrm>
+          <a:prstGeom prst="ellipse">
+            <a:avLst/>
+          </a:prstGeom>
+          <a:noFill/>
+          <a:ln w="38100" cmpd="sng">
+            <a:solidFill>
+              <a:schemeClr val="tx1"/>
+            </a:solidFill>
+          </a:ln>
+        </p:spPr>
+        <p:style>
+          <a:lnRef idx="1">
+            <a:schemeClr val="accent1"/>
+          </a:lnRef>
+          <a:fillRef idx="3">
+            <a:schemeClr val="accent1"/>
+          </a:fillRef>
+          <a:effectRef idx="2">
+            <a:schemeClr val="accent1"/>
+          </a:effectRef>
+          <a:fontRef idx="minor">
+            <a:schemeClr val="lt1"/>
+          </a:fontRef>
+        </p:style>
+        <p:txBody>
+          <a:bodyPr rtlCol="0" anchor="ctr"/>
+          <a:lstStyle/>
+          <a:p>
+            <a:pPr algn="ctr"/>
+            <a:r>
+              <a:rPr lang="en-US" sz="4000" b="1" dirty="0" smtClean="0">
+                <a:solidFill>
+                  <a:schemeClr val="tx1"/>
+                </a:solidFill>
+              </a:rPr>
+              <a:t>A</a:t>
+            </a:r>
+            <a:endParaRPr lang="en-US" sz="4000" b="1" dirty="0">
+              <a:solidFill>
+                <a:schemeClr val="tx1"/>
+              </a:solidFill>
+            </a:endParaRPr>
+          </a:p>
+        </p:txBody>
+      </p:sp>
+      <p:sp>
+        <p:nvSpPr>
+          <p:cNvPr id="3" name="Oval 2"/>
+          <p:cNvSpPr/>
+          <p:nvPr/>
+        </p:nvSpPr>
+        <p:spPr>
+          <a:xfrm>
+            <a:off x="784371" y="4937365"/>
+            <a:ext cx="914400" cy="914400"/>
+          </a:xfrm>
+          <a:prstGeom prst="ellipse">
+            <a:avLst/>
+          </a:prstGeom>
+          <a:noFill/>
+          <a:ln w="38100" cmpd="sng">
+            <a:solidFill>
+              <a:srgbClr val="000000"/>
+            </a:solidFill>
+          </a:ln>
+        </p:spPr>
+        <p:style>
+          <a:lnRef idx="1">
+            <a:schemeClr val="accent1"/>
+          </a:lnRef>
+          <a:fillRef idx="3">
+            <a:schemeClr val="accent1"/>
+          </a:fillRef>
+          <a:effectRef idx="2">
+            <a:schemeClr val="accent1"/>
+          </a:effectRef>
+          <a:fontRef idx="minor">
+            <a:schemeClr val="lt1"/>
+          </a:fontRef>
+        </p:style>
+        <p:txBody>
+          <a:bodyPr rtlCol="0" anchor="ctr"/>
+          <a:lstStyle/>
+          <a:p>
+            <a:pPr algn="ctr"/>
+            <a:r>
+              <a:rPr lang="en-US" sz="4000" b="1" dirty="0" smtClean="0">
+                <a:solidFill>
+                  <a:srgbClr val="000000"/>
+                </a:solidFill>
+              </a:rPr>
+              <a:t>B</a:t>
+            </a:r>
+            <a:endParaRPr lang="en-US" sz="4000" b="1" dirty="0">
+              <a:solidFill>
+                <a:srgbClr val="000000"/>
+              </a:solidFill>
+            </a:endParaRPr>
+          </a:p>
+        </p:txBody>
+      </p:sp>
+      <p:cxnSp>
+        <p:nvCxnSpPr>
+          <p:cNvPr id="4" name="Straight Arrow Connector 3"/>
+          <p:cNvCxnSpPr>
+            <a:stCxn id="2" idx="4"/>
+            <a:endCxn id="3" idx="0"/>
+          </p:cNvCxnSpPr>
+          <p:nvPr/>
+        </p:nvCxnSpPr>
+        <p:spPr>
+          <a:xfrm flipH="1">
+            <a:off x="1241571" y="1822285"/>
+            <a:ext cx="5065161" cy="3115080"/>
+          </a:xfrm>
+          <a:prstGeom prst="straightConnector1">
+            <a:avLst/>
+          </a:prstGeom>
+          <a:ln w="76200" cmpd="sng">
+            <a:solidFill>
+              <a:schemeClr val="accent1"/>
+            </a:solidFill>
+            <a:headEnd type="arrow"/>
+            <a:tailEnd type="none"/>
+          </a:ln>
+        </p:spPr>
+        <p:style>
+          <a:lnRef idx="2">
+            <a:schemeClr val="accent1"/>
+          </a:lnRef>
+          <a:fillRef idx="0">
+            <a:schemeClr val="accent1"/>
+          </a:fillRef>
+          <a:effectRef idx="1">
+            <a:schemeClr val="accent1"/>
+          </a:effectRef>
+          <a:fontRef idx="minor">
+            <a:schemeClr val="tx1"/>
+          </a:fontRef>
+        </p:style>
+      </p:cxnSp>
+      <p:cxnSp>
+        <p:nvCxnSpPr>
+          <p:cNvPr id="5" name="Curved Connector 4"/>
+          <p:cNvCxnSpPr>
+            <a:stCxn id="2" idx="2"/>
+            <a:endCxn id="3" idx="0"/>
+          </p:cNvCxnSpPr>
+          <p:nvPr/>
+        </p:nvCxnSpPr>
+        <p:spPr>
+          <a:xfrm rot="10800000" flipV="1">
+            <a:off x="1241572" y="1365085"/>
+            <a:ext cx="4607961" cy="3572280"/>
+          </a:xfrm>
+          <a:prstGeom prst="curvedConnector2">
+            <a:avLst/>
+          </a:prstGeom>
+          <a:ln w="76200" cmpd="sng">
+            <a:headEnd type="none"/>
+            <a:tailEnd type="arrow"/>
+          </a:ln>
+        </p:spPr>
+        <p:style>
+          <a:lnRef idx="2">
+            <a:schemeClr val="accent1"/>
+          </a:lnRef>
+          <a:fillRef idx="0">
+            <a:schemeClr val="accent1"/>
+          </a:fillRef>
+          <a:effectRef idx="1">
+            <a:schemeClr val="accent1"/>
+          </a:effectRef>
+          <a:fontRef idx="minor">
+            <a:schemeClr val="tx1"/>
+          </a:fontRef>
+        </p:style>
+      </p:cxnSp>
+      <p:sp>
+        <p:nvSpPr>
+          <p:cNvPr id="8" name="TextBox 7"/>
+          <p:cNvSpPr txBox="1"/>
+          <p:nvPr/>
+        </p:nvSpPr>
+        <p:spPr>
+          <a:xfrm>
+            <a:off x="1556845" y="3769611"/>
+            <a:ext cx="420357" cy="707886"/>
+          </a:xfrm>
+          <a:prstGeom prst="rect">
+            <a:avLst/>
+          </a:prstGeom>
+          <a:noFill/>
+        </p:spPr>
+        <p:txBody>
+          <a:bodyPr wrap="none" rtlCol="0">
+            <a:spAutoFit/>
+          </a:bodyPr>
+          <a:lstStyle/>
+          <a:p>
+            <a:r>
+              <a:rPr lang="en-US" sz="4000" b="1" dirty="0"/>
+              <a:t>x</a:t>
+            </a:r>
+          </a:p>
+        </p:txBody>
+      </p:sp>
+      <p:sp>
+        <p:nvSpPr>
+          <p:cNvPr id="9" name="TextBox 8"/>
+          <p:cNvSpPr txBox="1"/>
+          <p:nvPr/>
+        </p:nvSpPr>
+        <p:spPr>
+          <a:xfrm>
+            <a:off x="4829669" y="687853"/>
+            <a:ext cx="387296" cy="707886"/>
+          </a:xfrm>
+          <a:prstGeom prst="rect">
+            <a:avLst/>
+          </a:prstGeom>
+          <a:noFill/>
+        </p:spPr>
+        <p:txBody>
+          <a:bodyPr wrap="none" rtlCol="0">
+            <a:spAutoFit/>
+          </a:bodyPr>
+          <a:lstStyle/>
+          <a:p>
+            <a:r>
+              <a:rPr lang="en-US" sz="4000" b="1" dirty="0"/>
+              <a:t>z</a:t>
+            </a:r>
+          </a:p>
+        </p:txBody>
+      </p:sp>
+      <p:cxnSp>
+        <p:nvCxnSpPr>
+          <p:cNvPr id="14" name="Curved Connector 13"/>
+          <p:cNvCxnSpPr>
+            <a:stCxn id="3" idx="6"/>
+            <a:endCxn id="2" idx="5"/>
+          </p:cNvCxnSpPr>
+          <p:nvPr/>
+        </p:nvCxnSpPr>
+        <p:spPr>
+          <a:xfrm flipV="1">
+            <a:off x="1698771" y="1688374"/>
+            <a:ext cx="4931250" cy="3706191"/>
+          </a:xfrm>
+          <a:prstGeom prst="curvedConnector2">
+            <a:avLst/>
+          </a:prstGeom>
+          <a:ln w="76200" cmpd="sng">
+            <a:headEnd type="none"/>
+            <a:tailEnd type="arrow"/>
+          </a:ln>
+        </p:spPr>
+        <p:style>
+          <a:lnRef idx="2">
+            <a:schemeClr val="accent1"/>
+          </a:lnRef>
+          <a:fillRef idx="0">
+            <a:schemeClr val="accent1"/>
+          </a:fillRef>
+          <a:effectRef idx="1">
+            <a:schemeClr val="accent1"/>
+          </a:effectRef>
+          <a:fontRef idx="minor">
+            <a:schemeClr val="tx1"/>
+          </a:fontRef>
+        </p:style>
+      </p:cxnSp>
+      <p:sp>
+        <p:nvSpPr>
+          <p:cNvPr id="15" name="TextBox 14"/>
+          <p:cNvSpPr txBox="1"/>
+          <p:nvPr/>
+        </p:nvSpPr>
+        <p:spPr>
+          <a:xfrm>
+            <a:off x="2358312" y="4583422"/>
+            <a:ext cx="428322" cy="707886"/>
+          </a:xfrm>
+          <a:prstGeom prst="rect">
+            <a:avLst/>
+          </a:prstGeom>
+          <a:noFill/>
+        </p:spPr>
+        <p:txBody>
+          <a:bodyPr wrap="none" rtlCol="0">
+            <a:spAutoFit/>
+          </a:bodyPr>
+          <a:lstStyle/>
+          <a:p>
+            <a:r>
+              <a:rPr lang="en-US" sz="4000" b="1" dirty="0"/>
+              <a:t>y</a:t>
+            </a:r>
+          </a:p>
+        </p:txBody>
+      </p:sp>
+      <p:sp>
+        <p:nvSpPr>
+          <p:cNvPr id="16" name="TextBox 15"/>
+          <p:cNvSpPr txBox="1"/>
+          <p:nvPr/>
+        </p:nvSpPr>
+        <p:spPr>
+          <a:xfrm>
+            <a:off x="6998751" y="78069"/>
+            <a:ext cx="1877437" cy="707886"/>
+          </a:xfrm>
+          <a:prstGeom prst="rect">
+            <a:avLst/>
+          </a:prstGeom>
+          <a:noFill/>
+        </p:spPr>
+        <p:txBody>
+          <a:bodyPr wrap="none" rtlCol="0">
+            <a:spAutoFit/>
+          </a:bodyPr>
+          <a:lstStyle/>
+          <a:p>
+            <a:r>
+              <a:rPr lang="en-US" sz="4000" b="1" dirty="0" smtClean="0"/>
+              <a:t>Agent A</a:t>
+            </a:r>
+            <a:endParaRPr lang="en-US" sz="4000" b="1" dirty="0"/>
+          </a:p>
+        </p:txBody>
+      </p:sp>
+      <p:cxnSp>
+        <p:nvCxnSpPr>
+          <p:cNvPr id="18" name="Straight Arrow Connector 17"/>
+          <p:cNvCxnSpPr>
+            <a:stCxn id="16" idx="1"/>
+            <a:endCxn id="2" idx="7"/>
+          </p:cNvCxnSpPr>
+          <p:nvPr/>
+        </p:nvCxnSpPr>
+        <p:spPr>
+          <a:xfrm flipH="1">
+            <a:off x="6630021" y="432012"/>
+            <a:ext cx="368730" cy="609784"/>
+          </a:xfrm>
+          <a:prstGeom prst="straightConnector1">
+            <a:avLst/>
+          </a:prstGeom>
+          <a:ln>
+            <a:prstDash val="dash"/>
+            <a:tailEnd type="arrow"/>
+          </a:ln>
+        </p:spPr>
+        <p:style>
+          <a:lnRef idx="2">
+            <a:schemeClr val="accent1"/>
+          </a:lnRef>
+          <a:fillRef idx="0">
+            <a:schemeClr val="accent1"/>
+          </a:fillRef>
+          <a:effectRef idx="1">
+            <a:schemeClr val="accent1"/>
+          </a:effectRef>
+          <a:fontRef idx="minor">
+            <a:schemeClr val="tx1"/>
+          </a:fontRef>
+        </p:style>
+      </p:cxnSp>
+      <p:sp>
+        <p:nvSpPr>
+          <p:cNvPr id="28" name="Oval 27"/>
+          <p:cNvSpPr>
+            <a:spLocks noChangeAspect="1"/>
+          </p:cNvSpPr>
+          <p:nvPr/>
+        </p:nvSpPr>
+        <p:spPr>
+          <a:xfrm>
+            <a:off x="2538557" y="1547965"/>
+            <a:ext cx="637090" cy="640080"/>
+          </a:xfrm>
+          <a:prstGeom prst="ellipse">
+            <a:avLst/>
+          </a:prstGeom>
+          <a:noFill/>
+          <a:ln w="28575" cmpd="sng">
+            <a:solidFill>
+              <a:srgbClr val="FF0000"/>
+            </a:solidFill>
+          </a:ln>
+        </p:spPr>
+        <p:style>
+          <a:lnRef idx="1">
+            <a:schemeClr val="accent1"/>
+          </a:lnRef>
+          <a:fillRef idx="3">
+            <a:schemeClr val="accent1"/>
+          </a:fillRef>
+          <a:effectRef idx="2">
+            <a:schemeClr val="accent1"/>
+          </a:effectRef>
+          <a:fontRef idx="minor">
+            <a:schemeClr val="lt1"/>
+          </a:fontRef>
+        </p:style>
+        <p:txBody>
+          <a:bodyPr rtlCol="0" anchor="ctr"/>
+          <a:lstStyle/>
+          <a:p>
+            <a:pPr algn="ctr"/>
+            <a:r>
+              <a:rPr lang="en-US" sz="4000" b="1" dirty="0">
+                <a:solidFill>
+                  <a:schemeClr val="tx1"/>
+                </a:solidFill>
+              </a:rPr>
+              <a:t>0</a:t>
+            </a:r>
+          </a:p>
+        </p:txBody>
+      </p:sp>
+      <p:sp>
+        <p:nvSpPr>
+          <p:cNvPr id="29" name="Oval 28"/>
+          <p:cNvSpPr>
+            <a:spLocks noChangeAspect="1"/>
+          </p:cNvSpPr>
+          <p:nvPr/>
+        </p:nvSpPr>
+        <p:spPr>
+          <a:xfrm>
+            <a:off x="1721222" y="2110508"/>
+            <a:ext cx="637090" cy="640080"/>
+          </a:xfrm>
+          <a:prstGeom prst="ellipse">
+            <a:avLst/>
+          </a:prstGeom>
+          <a:noFill/>
+          <a:ln w="28575" cmpd="sng">
+            <a:solidFill>
+              <a:srgbClr val="FF0000"/>
+            </a:solidFill>
+          </a:ln>
+        </p:spPr>
+        <p:style>
+          <a:lnRef idx="1">
+            <a:schemeClr val="accent1"/>
+          </a:lnRef>
+          <a:fillRef idx="3">
+            <a:schemeClr val="accent1"/>
+          </a:fillRef>
+          <a:effectRef idx="2">
+            <a:schemeClr val="accent1"/>
+          </a:effectRef>
+          <a:fontRef idx="minor">
+            <a:schemeClr val="lt1"/>
+          </a:fontRef>
+        </p:style>
+        <p:txBody>
+          <a:bodyPr rtlCol="0" anchor="ctr"/>
+          <a:lstStyle/>
+          <a:p>
+            <a:pPr algn="ctr"/>
+            <a:r>
+              <a:rPr lang="en-US" sz="4000" b="1" dirty="0">
+                <a:solidFill>
+                  <a:schemeClr val="tx1"/>
+                </a:solidFill>
+              </a:rPr>
+              <a:t>3</a:t>
+            </a:r>
+          </a:p>
+        </p:txBody>
+      </p:sp>
+      <p:sp>
+        <p:nvSpPr>
+          <p:cNvPr id="30" name="Oval 29"/>
+          <p:cNvSpPr>
+            <a:spLocks noChangeAspect="1"/>
+          </p:cNvSpPr>
+          <p:nvPr/>
+        </p:nvSpPr>
+        <p:spPr>
+          <a:xfrm>
+            <a:off x="1238300" y="2787868"/>
+            <a:ext cx="637090" cy="640080"/>
+          </a:xfrm>
+          <a:prstGeom prst="ellipse">
+            <a:avLst/>
+          </a:prstGeom>
+          <a:noFill/>
+          <a:ln w="28575" cmpd="sng">
+            <a:solidFill>
+              <a:srgbClr val="FF0000"/>
+            </a:solidFill>
+          </a:ln>
+        </p:spPr>
+        <p:style>
+          <a:lnRef idx="1">
+            <a:schemeClr val="accent1"/>
+          </a:lnRef>
+          <a:fillRef idx="3">
+            <a:schemeClr val="accent1"/>
+          </a:fillRef>
+          <a:effectRef idx="2">
+            <a:schemeClr val="accent1"/>
+          </a:effectRef>
+          <a:fontRef idx="minor">
+            <a:schemeClr val="lt1"/>
+          </a:fontRef>
+        </p:style>
+        <p:txBody>
+          <a:bodyPr rtlCol="0" anchor="ctr"/>
+          <a:lstStyle/>
+          <a:p>
+            <a:pPr algn="ctr"/>
+            <a:r>
+              <a:rPr lang="en-US" sz="4000" b="1" dirty="0">
+                <a:solidFill>
+                  <a:schemeClr val="tx1"/>
+                </a:solidFill>
+              </a:rPr>
+              <a:t>2</a:t>
+            </a:r>
+          </a:p>
+        </p:txBody>
+      </p:sp>
+      <p:sp>
+        <p:nvSpPr>
+          <p:cNvPr id="31" name="Oval 30"/>
+          <p:cNvSpPr>
+            <a:spLocks noChangeAspect="1"/>
+          </p:cNvSpPr>
+          <p:nvPr/>
+        </p:nvSpPr>
+        <p:spPr>
+          <a:xfrm>
+            <a:off x="3550555" y="987197"/>
+            <a:ext cx="637090" cy="640080"/>
+          </a:xfrm>
+          <a:prstGeom prst="ellipse">
+            <a:avLst/>
+          </a:prstGeom>
+          <a:noFill/>
+          <a:ln w="28575" cmpd="sng">
+            <a:solidFill>
+              <a:srgbClr val="FF0000"/>
+            </a:solidFill>
+          </a:ln>
+        </p:spPr>
+        <p:style>
+          <a:lnRef idx="1">
+            <a:schemeClr val="accent1"/>
+          </a:lnRef>
+          <a:fillRef idx="3">
+            <a:schemeClr val="accent1"/>
+          </a:fillRef>
+          <a:effectRef idx="2">
+            <a:schemeClr val="accent1"/>
+          </a:effectRef>
+          <a:fontRef idx="minor">
+            <a:schemeClr val="lt1"/>
+          </a:fontRef>
+        </p:style>
+        <p:txBody>
+          <a:bodyPr rtlCol="0" anchor="ctr"/>
+          <a:lstStyle/>
+          <a:p>
+            <a:pPr algn="ctr"/>
+            <a:r>
+              <a:rPr lang="en-US" sz="4000" b="1" dirty="0">
+                <a:solidFill>
+                  <a:schemeClr val="tx1"/>
+                </a:solidFill>
+              </a:rPr>
+              <a:t>1</a:t>
+            </a:r>
+          </a:p>
+        </p:txBody>
+      </p:sp>
+    </p:spTree>
+    <p:extLst>
+      <p:ext uri="{BB962C8B-B14F-4D97-AF65-F5344CB8AC3E}">
+        <p14:creationId xmlns:p14="http://schemas.microsoft.com/office/powerpoint/2010/main" val="2113165922"/>
       </p:ext>
     </p:extLst>
   </p:cSld>

</xml_diff>

<commit_message>
Changed labels for agents A, B in the figures.
</commit_message>
<xml_diff>
--- a/DistributedSystemsIntroduction/DistributedSystemsIntroductionSelfTest.pptx
+++ b/DistributedSystemsIntroduction/DistributedSystemsIntroductionSelfTest.pptx
@@ -292,7 +292,7 @@
           <a:p>
             <a:fld id="{F6AE8460-8906-0249-A868-A782B0A77FF7}" type="datetimeFigureOut">
               <a:rPr lang="en-US" smtClean="0"/>
-              <a:t>10/11/21</a:t>
+              <a:t>10/13/21</a:t>
             </a:fld>
             <a:endParaRPr lang="en-US"/>
           </a:p>
@@ -462,7 +462,7 @@
           <a:p>
             <a:fld id="{F6AE8460-8906-0249-A868-A782B0A77FF7}" type="datetimeFigureOut">
               <a:rPr lang="en-US" smtClean="0"/>
-              <a:t>10/11/21</a:t>
+              <a:t>10/13/21</a:t>
             </a:fld>
             <a:endParaRPr lang="en-US"/>
           </a:p>
@@ -642,7 +642,7 @@
           <a:p>
             <a:fld id="{F6AE8460-8906-0249-A868-A782B0A77FF7}" type="datetimeFigureOut">
               <a:rPr lang="en-US" smtClean="0"/>
-              <a:t>10/11/21</a:t>
+              <a:t>10/13/21</a:t>
             </a:fld>
             <a:endParaRPr lang="en-US"/>
           </a:p>
@@ -812,7 +812,7 @@
           <a:p>
             <a:fld id="{F6AE8460-8906-0249-A868-A782B0A77FF7}" type="datetimeFigureOut">
               <a:rPr lang="en-US" smtClean="0"/>
-              <a:t>10/11/21</a:t>
+              <a:t>10/13/21</a:t>
             </a:fld>
             <a:endParaRPr lang="en-US"/>
           </a:p>
@@ -1058,7 +1058,7 @@
           <a:p>
             <a:fld id="{F6AE8460-8906-0249-A868-A782B0A77FF7}" type="datetimeFigureOut">
               <a:rPr lang="en-US" smtClean="0"/>
-              <a:t>10/11/21</a:t>
+              <a:t>10/13/21</a:t>
             </a:fld>
             <a:endParaRPr lang="en-US"/>
           </a:p>
@@ -1346,7 +1346,7 @@
           <a:p>
             <a:fld id="{F6AE8460-8906-0249-A868-A782B0A77FF7}" type="datetimeFigureOut">
               <a:rPr lang="en-US" smtClean="0"/>
-              <a:t>10/11/21</a:t>
+              <a:t>10/13/21</a:t>
             </a:fld>
             <a:endParaRPr lang="en-US"/>
           </a:p>
@@ -1768,7 +1768,7 @@
           <a:p>
             <a:fld id="{F6AE8460-8906-0249-A868-A782B0A77FF7}" type="datetimeFigureOut">
               <a:rPr lang="en-US" smtClean="0"/>
-              <a:t>10/11/21</a:t>
+              <a:t>10/13/21</a:t>
             </a:fld>
             <a:endParaRPr lang="en-US"/>
           </a:p>
@@ -1886,7 +1886,7 @@
           <a:p>
             <a:fld id="{F6AE8460-8906-0249-A868-A782B0A77FF7}" type="datetimeFigureOut">
               <a:rPr lang="en-US" smtClean="0"/>
-              <a:t>10/11/21</a:t>
+              <a:t>10/13/21</a:t>
             </a:fld>
             <a:endParaRPr lang="en-US"/>
           </a:p>
@@ -1981,7 +1981,7 @@
           <a:p>
             <a:fld id="{F6AE8460-8906-0249-A868-A782B0A77FF7}" type="datetimeFigureOut">
               <a:rPr lang="en-US" smtClean="0"/>
-              <a:t>10/11/21</a:t>
+              <a:t>10/13/21</a:t>
             </a:fld>
             <a:endParaRPr lang="en-US"/>
           </a:p>
@@ -2258,7 +2258,7 @@
           <a:p>
             <a:fld id="{F6AE8460-8906-0249-A868-A782B0A77FF7}" type="datetimeFigureOut">
               <a:rPr lang="en-US" smtClean="0"/>
-              <a:t>10/11/21</a:t>
+              <a:t>10/13/21</a:t>
             </a:fld>
             <a:endParaRPr lang="en-US"/>
           </a:p>
@@ -2511,7 +2511,7 @@
           <a:p>
             <a:fld id="{F6AE8460-8906-0249-A868-A782B0A77FF7}" type="datetimeFigureOut">
               <a:rPr lang="en-US" smtClean="0"/>
-              <a:t>10/11/21</a:t>
+              <a:t>10/13/21</a:t>
             </a:fld>
             <a:endParaRPr lang="en-US"/>
           </a:p>
@@ -2724,7 +2724,7 @@
           <a:p>
             <a:fld id="{F6AE8460-8906-0249-A868-A782B0A77FF7}" type="datetimeFigureOut">
               <a:rPr lang="en-US" smtClean="0"/>
-              <a:t>10/11/21</a:t>
+              <a:t>10/13/21</a:t>
             </a:fld>
             <a:endParaRPr lang="en-US"/>
           </a:p>
@@ -3140,12 +3140,12 @@
           <a:p>
             <a:pPr algn="ctr"/>
             <a:r>
-              <a:rPr lang="en-US" sz="4000" b="1" dirty="0" smtClean="0">
+              <a:rPr lang="en-US" sz="4000" b="1" dirty="0">
                 <a:solidFill>
                   <a:schemeClr val="tx1"/>
                 </a:solidFill>
               </a:rPr>
-              <a:t>A</a:t>
+              <a:t>B</a:t>
             </a:r>
             <a:endParaRPr lang="en-US" sz="4000" b="1" dirty="0">
               <a:solidFill>
@@ -3196,12 +3196,12 @@
           <a:p>
             <a:pPr algn="ctr"/>
             <a:r>
-              <a:rPr lang="en-US" sz="4000" b="1" dirty="0" smtClean="0">
+              <a:rPr lang="en-US" sz="4000" b="1" dirty="0">
                 <a:solidFill>
                   <a:srgbClr val="000000"/>
                 </a:solidFill>
               </a:rPr>
-              <a:t>B</a:t>
+              <a:t>A</a:t>
             </a:r>
             <a:endParaRPr lang="en-US" sz="4000" b="1" dirty="0">
               <a:solidFill>
@@ -3489,7 +3489,7 @@
         <p:spPr>
           <a:xfrm>
             <a:off x="6998751" y="78069"/>
-            <a:ext cx="1877437" cy="707886"/>
+            <a:ext cx="1853542" cy="707886"/>
           </a:xfrm>
           <a:prstGeom prst="rect">
             <a:avLst/>
@@ -3504,7 +3504,11 @@
           <a:p>
             <a:r>
               <a:rPr lang="en-US" sz="4000" b="1" dirty="0" smtClean="0"/>
-              <a:t>Agent A</a:t>
+              <a:t>Agent </a:t>
+            </a:r>
+            <a:r>
+              <a:rPr lang="en-US" sz="4000" b="1" dirty="0" smtClean="0"/>
+              <a:t>B</a:t>
             </a:r>
             <a:endParaRPr lang="en-US" sz="4000" b="1" dirty="0"/>
           </a:p>
@@ -3942,12 +3946,12 @@
           <a:p>
             <a:pPr algn="ctr"/>
             <a:r>
-              <a:rPr lang="en-US" sz="4000" b="1" dirty="0" smtClean="0">
+              <a:rPr lang="en-US" sz="4000" b="1" dirty="0">
                 <a:solidFill>
                   <a:schemeClr val="tx1"/>
                 </a:solidFill>
               </a:rPr>
-              <a:t>A</a:t>
+              <a:t>B</a:t>
             </a:r>
             <a:endParaRPr lang="en-US" sz="4000" b="1" dirty="0">
               <a:solidFill>
@@ -3998,12 +4002,12 @@
           <a:p>
             <a:pPr algn="ctr"/>
             <a:r>
-              <a:rPr lang="en-US" sz="4000" b="1" dirty="0" smtClean="0">
+              <a:rPr lang="en-US" sz="4000" b="1" dirty="0">
                 <a:solidFill>
                   <a:srgbClr val="000000"/>
                 </a:solidFill>
               </a:rPr>
-              <a:t>B</a:t>
+              <a:t>A</a:t>
             </a:r>
             <a:endParaRPr lang="en-US" sz="4000" b="1" dirty="0">
               <a:solidFill>
@@ -4214,73 +4218,6 @@
           </a:p>
         </p:txBody>
       </p:sp>
-      <p:sp>
-        <p:nvSpPr>
-          <p:cNvPr id="16" name="TextBox 15"/>
-          <p:cNvSpPr txBox="1"/>
-          <p:nvPr/>
-        </p:nvSpPr>
-        <p:spPr>
-          <a:xfrm>
-            <a:off x="6998751" y="78069"/>
-            <a:ext cx="1877437" cy="707886"/>
-          </a:xfrm>
-          <a:prstGeom prst="rect">
-            <a:avLst/>
-          </a:prstGeom>
-          <a:noFill/>
-        </p:spPr>
-        <p:txBody>
-          <a:bodyPr wrap="none" rtlCol="0">
-            <a:spAutoFit/>
-          </a:bodyPr>
-          <a:lstStyle/>
-          <a:p>
-            <a:r>
-              <a:rPr lang="en-US" sz="4000" b="1" dirty="0" smtClean="0"/>
-              <a:t>Agent A</a:t>
-            </a:r>
-            <a:endParaRPr lang="en-US" sz="4000" b="1" dirty="0"/>
-          </a:p>
-        </p:txBody>
-      </p:sp>
-      <p:cxnSp>
-        <p:nvCxnSpPr>
-          <p:cNvPr id="18" name="Straight Arrow Connector 17"/>
-          <p:cNvCxnSpPr>
-            <a:stCxn id="16" idx="1"/>
-            <a:endCxn id="2" idx="7"/>
-          </p:cNvCxnSpPr>
-          <p:nvPr/>
-        </p:nvCxnSpPr>
-        <p:spPr>
-          <a:xfrm flipH="1">
-            <a:off x="6630021" y="432012"/>
-            <a:ext cx="368730" cy="609784"/>
-          </a:xfrm>
-          <a:prstGeom prst="straightConnector1">
-            <a:avLst/>
-          </a:prstGeom>
-          <a:ln>
-            <a:prstDash val="dash"/>
-            <a:tailEnd type="arrow"/>
-          </a:ln>
-        </p:spPr>
-        <p:style>
-          <a:lnRef idx="2">
-            <a:schemeClr val="accent1"/>
-          </a:lnRef>
-          <a:fillRef idx="0">
-            <a:schemeClr val="accent1"/>
-          </a:fillRef>
-          <a:effectRef idx="1">
-            <a:schemeClr val="accent1"/>
-          </a:effectRef>
-          <a:fontRef idx="minor">
-            <a:schemeClr val="tx1"/>
-          </a:fontRef>
-        </p:style>
-      </p:cxnSp>
       <p:sp>
         <p:nvSpPr>
           <p:cNvPr id="28" name="Oval 27"/>
@@ -4574,12 +4511,12 @@
           <a:p>
             <a:pPr algn="ctr"/>
             <a:r>
-              <a:rPr lang="en-US" sz="4000" b="1" dirty="0" smtClean="0">
+              <a:rPr lang="en-US" sz="4000" b="1" dirty="0">
                 <a:solidFill>
                   <a:schemeClr val="tx1"/>
                 </a:solidFill>
               </a:rPr>
-              <a:t>A</a:t>
+              <a:t>B</a:t>
             </a:r>
             <a:endParaRPr lang="en-US" sz="4000" b="1" dirty="0">
               <a:solidFill>
@@ -4630,12 +4567,12 @@
           <a:p>
             <a:pPr algn="ctr"/>
             <a:r>
-              <a:rPr lang="en-US" sz="4000" b="1" dirty="0" smtClean="0">
+              <a:rPr lang="en-US" sz="4000" b="1" dirty="0">
                 <a:solidFill>
                   <a:srgbClr val="000000"/>
                 </a:solidFill>
               </a:rPr>
-              <a:t>B</a:t>
+              <a:t>A</a:t>
             </a:r>
             <a:endParaRPr lang="en-US" sz="4000" b="1" dirty="0">
               <a:solidFill>
@@ -4846,73 +4783,6 @@
           </a:p>
         </p:txBody>
       </p:sp>
-      <p:sp>
-        <p:nvSpPr>
-          <p:cNvPr id="16" name="TextBox 15"/>
-          <p:cNvSpPr txBox="1"/>
-          <p:nvPr/>
-        </p:nvSpPr>
-        <p:spPr>
-          <a:xfrm>
-            <a:off x="6998751" y="78069"/>
-            <a:ext cx="1877437" cy="707886"/>
-          </a:xfrm>
-          <a:prstGeom prst="rect">
-            <a:avLst/>
-          </a:prstGeom>
-          <a:noFill/>
-        </p:spPr>
-        <p:txBody>
-          <a:bodyPr wrap="none" rtlCol="0">
-            <a:spAutoFit/>
-          </a:bodyPr>
-          <a:lstStyle/>
-          <a:p>
-            <a:r>
-              <a:rPr lang="en-US" sz="4000" b="1" dirty="0" smtClean="0"/>
-              <a:t>Agent A</a:t>
-            </a:r>
-            <a:endParaRPr lang="en-US" sz="4000" b="1" dirty="0"/>
-          </a:p>
-        </p:txBody>
-      </p:sp>
-      <p:cxnSp>
-        <p:nvCxnSpPr>
-          <p:cNvPr id="18" name="Straight Arrow Connector 17"/>
-          <p:cNvCxnSpPr>
-            <a:stCxn id="16" idx="1"/>
-            <a:endCxn id="2" idx="7"/>
-          </p:cNvCxnSpPr>
-          <p:nvPr/>
-        </p:nvCxnSpPr>
-        <p:spPr>
-          <a:xfrm flipH="1">
-            <a:off x="6630021" y="432012"/>
-            <a:ext cx="368730" cy="609784"/>
-          </a:xfrm>
-          <a:prstGeom prst="straightConnector1">
-            <a:avLst/>
-          </a:prstGeom>
-          <a:ln>
-            <a:prstDash val="dash"/>
-            <a:tailEnd type="arrow"/>
-          </a:ln>
-        </p:spPr>
-        <p:style>
-          <a:lnRef idx="2">
-            <a:schemeClr val="accent1"/>
-          </a:lnRef>
-          <a:fillRef idx="0">
-            <a:schemeClr val="accent1"/>
-          </a:fillRef>
-          <a:effectRef idx="1">
-            <a:schemeClr val="accent1"/>
-          </a:effectRef>
-          <a:fontRef idx="minor">
-            <a:schemeClr val="tx1"/>
-          </a:fontRef>
-        </p:style>
-      </p:cxnSp>
       <p:sp>
         <p:nvSpPr>
           <p:cNvPr id="28" name="Oval 27"/>
@@ -5196,12 +5066,12 @@
           <a:p>
             <a:pPr algn="ctr"/>
             <a:r>
-              <a:rPr lang="en-US" sz="4000" b="1" dirty="0" smtClean="0">
+              <a:rPr lang="en-US" sz="4000" b="1" dirty="0">
                 <a:solidFill>
                   <a:schemeClr val="tx1"/>
                 </a:solidFill>
               </a:rPr>
-              <a:t>A</a:t>
+              <a:t>B</a:t>
             </a:r>
             <a:endParaRPr lang="en-US" sz="4000" b="1" dirty="0">
               <a:solidFill>
@@ -5252,12 +5122,12 @@
           <a:p>
             <a:pPr algn="ctr"/>
             <a:r>
-              <a:rPr lang="en-US" sz="4000" b="1" dirty="0" smtClean="0">
+              <a:rPr lang="en-US" sz="4000" b="1" dirty="0">
                 <a:solidFill>
                   <a:srgbClr val="000000"/>
                 </a:solidFill>
               </a:rPr>
-              <a:t>B</a:t>
+              <a:t>A</a:t>
             </a:r>
             <a:endParaRPr lang="en-US" sz="4000" b="1" dirty="0">
               <a:solidFill>
@@ -5468,73 +5338,6 @@
           </a:p>
         </p:txBody>
       </p:sp>
-      <p:sp>
-        <p:nvSpPr>
-          <p:cNvPr id="16" name="TextBox 15"/>
-          <p:cNvSpPr txBox="1"/>
-          <p:nvPr/>
-        </p:nvSpPr>
-        <p:spPr>
-          <a:xfrm>
-            <a:off x="6998751" y="78069"/>
-            <a:ext cx="1877437" cy="707886"/>
-          </a:xfrm>
-          <a:prstGeom prst="rect">
-            <a:avLst/>
-          </a:prstGeom>
-          <a:noFill/>
-        </p:spPr>
-        <p:txBody>
-          <a:bodyPr wrap="none" rtlCol="0">
-            <a:spAutoFit/>
-          </a:bodyPr>
-          <a:lstStyle/>
-          <a:p>
-            <a:r>
-              <a:rPr lang="en-US" sz="4000" b="1" dirty="0" smtClean="0"/>
-              <a:t>Agent A</a:t>
-            </a:r>
-            <a:endParaRPr lang="en-US" sz="4000" b="1" dirty="0"/>
-          </a:p>
-        </p:txBody>
-      </p:sp>
-      <p:cxnSp>
-        <p:nvCxnSpPr>
-          <p:cNvPr id="18" name="Straight Arrow Connector 17"/>
-          <p:cNvCxnSpPr>
-            <a:stCxn id="16" idx="1"/>
-            <a:endCxn id="2" idx="7"/>
-          </p:cNvCxnSpPr>
-          <p:nvPr/>
-        </p:nvCxnSpPr>
-        <p:spPr>
-          <a:xfrm flipH="1">
-            <a:off x="6630021" y="432012"/>
-            <a:ext cx="368730" cy="609784"/>
-          </a:xfrm>
-          <a:prstGeom prst="straightConnector1">
-            <a:avLst/>
-          </a:prstGeom>
-          <a:ln>
-            <a:prstDash val="dash"/>
-            <a:tailEnd type="arrow"/>
-          </a:ln>
-        </p:spPr>
-        <p:style>
-          <a:lnRef idx="2">
-            <a:schemeClr val="accent1"/>
-          </a:lnRef>
-          <a:fillRef idx="0">
-            <a:schemeClr val="accent1"/>
-          </a:fillRef>
-          <a:effectRef idx="1">
-            <a:schemeClr val="accent1"/>
-          </a:effectRef>
-          <a:fontRef idx="minor">
-            <a:schemeClr val="tx1"/>
-          </a:fontRef>
-        </p:style>
-      </p:cxnSp>
       <p:sp>
         <p:nvSpPr>
           <p:cNvPr id="28" name="Oval 27"/>
@@ -5818,12 +5621,12 @@
           <a:p>
             <a:pPr algn="ctr"/>
             <a:r>
-              <a:rPr lang="en-US" sz="4000" b="1" dirty="0" smtClean="0">
+              <a:rPr lang="en-US" sz="4000" b="1" dirty="0">
                 <a:solidFill>
                   <a:schemeClr val="tx1"/>
                 </a:solidFill>
               </a:rPr>
-              <a:t>A</a:t>
+              <a:t>B</a:t>
             </a:r>
             <a:endParaRPr lang="en-US" sz="4000" b="1" dirty="0">
               <a:solidFill>
@@ -5874,12 +5677,12 @@
           <a:p>
             <a:pPr algn="ctr"/>
             <a:r>
-              <a:rPr lang="en-US" sz="4000" b="1" dirty="0" smtClean="0">
+              <a:rPr lang="en-US" sz="4000" b="1" dirty="0">
                 <a:solidFill>
                   <a:srgbClr val="000000"/>
                 </a:solidFill>
               </a:rPr>
-              <a:t>B</a:t>
+              <a:t>A</a:t>
             </a:r>
             <a:endParaRPr lang="en-US" sz="4000" b="1" dirty="0">
               <a:solidFill>
@@ -6090,73 +5893,6 @@
           </a:p>
         </p:txBody>
       </p:sp>
-      <p:sp>
-        <p:nvSpPr>
-          <p:cNvPr id="16" name="TextBox 15"/>
-          <p:cNvSpPr txBox="1"/>
-          <p:nvPr/>
-        </p:nvSpPr>
-        <p:spPr>
-          <a:xfrm>
-            <a:off x="6998751" y="78069"/>
-            <a:ext cx="1877437" cy="707886"/>
-          </a:xfrm>
-          <a:prstGeom prst="rect">
-            <a:avLst/>
-          </a:prstGeom>
-          <a:noFill/>
-        </p:spPr>
-        <p:txBody>
-          <a:bodyPr wrap="none" rtlCol="0">
-            <a:spAutoFit/>
-          </a:bodyPr>
-          <a:lstStyle/>
-          <a:p>
-            <a:r>
-              <a:rPr lang="en-US" sz="4000" b="1" dirty="0" smtClean="0"/>
-              <a:t>Agent A</a:t>
-            </a:r>
-            <a:endParaRPr lang="en-US" sz="4000" b="1" dirty="0"/>
-          </a:p>
-        </p:txBody>
-      </p:sp>
-      <p:cxnSp>
-        <p:nvCxnSpPr>
-          <p:cNvPr id="18" name="Straight Arrow Connector 17"/>
-          <p:cNvCxnSpPr>
-            <a:stCxn id="16" idx="1"/>
-            <a:endCxn id="2" idx="7"/>
-          </p:cNvCxnSpPr>
-          <p:nvPr/>
-        </p:nvCxnSpPr>
-        <p:spPr>
-          <a:xfrm flipH="1">
-            <a:off x="6630021" y="432012"/>
-            <a:ext cx="368730" cy="609784"/>
-          </a:xfrm>
-          <a:prstGeom prst="straightConnector1">
-            <a:avLst/>
-          </a:prstGeom>
-          <a:ln>
-            <a:prstDash val="dash"/>
-            <a:tailEnd type="arrow"/>
-          </a:ln>
-        </p:spPr>
-        <p:style>
-          <a:lnRef idx="2">
-            <a:schemeClr val="accent1"/>
-          </a:lnRef>
-          <a:fillRef idx="0">
-            <a:schemeClr val="accent1"/>
-          </a:fillRef>
-          <a:effectRef idx="1">
-            <a:schemeClr val="accent1"/>
-          </a:effectRef>
-          <a:fontRef idx="minor">
-            <a:schemeClr val="tx1"/>
-          </a:fontRef>
-        </p:style>
-      </p:cxnSp>
       <p:sp>
         <p:nvSpPr>
           <p:cNvPr id="28" name="Oval 27"/>

</xml_diff>